<commit_message>
adding png instead and removing extra from slide deck
</commit_message>
<xml_diff>
--- a/code/recruitment figures/waffle plot overall/waffle_figure_v6_June2024_michele.pptx
+++ b/code/recruitment figures/waffle plot overall/waffle_figure_v6_June2024_michele.pptx
@@ -6,7 +6,6 @@
   </p:sldMasterIdLst>
   <p:sldIdLst>
     <p:sldId id="256" r:id="rId2"/>
-    <p:sldId id="257" r:id="rId3"/>
   </p:sldIdLst>
   <p:sldSz cx="12192000" cy="6858000"/>
   <p:notesSz cx="6858000" cy="9144000"/>
@@ -3653,341 +3652,6 @@
 </p:sld>
 </file>
 
-<file path=ppt/slides/slide2.xml><?xml version="1.0" encoding="utf-8"?>
-<p:sld xmlns:a="http://schemas.openxmlformats.org/drawingml/2006/main" xmlns:r="http://schemas.openxmlformats.org/officeDocument/2006/relationships" xmlns:p="http://schemas.openxmlformats.org/presentationml/2006/main">
-  <p:cSld>
-    <p:spTree>
-      <p:nvGrpSpPr>
-        <p:cNvPr id="1" name=""/>
-        <p:cNvGrpSpPr/>
-        <p:nvPr/>
-      </p:nvGrpSpPr>
-      <p:grpSpPr>
-        <a:xfrm>
-          <a:off x="0" y="0"/>
-          <a:ext cx="0" cy="0"/>
-          <a:chOff x="0" y="0"/>
-          <a:chExt cx="0" cy="0"/>
-        </a:xfrm>
-      </p:grpSpPr>
-      <p:pic>
-        <p:nvPicPr>
-          <p:cNvPr id="3" name="Picture 2" descr="A picture containing text, diagram, font, plot&#10;&#10;Description automatically generated">
-            <a:extLst>
-              <a:ext uri="{FF2B5EF4-FFF2-40B4-BE49-F238E27FC236}">
-                <a16:creationId xmlns:a16="http://schemas.microsoft.com/office/drawing/2014/main" id="{10A68E39-7251-94F8-CA95-0BB581FDFEB1}"/>
-              </a:ext>
-            </a:extLst>
-          </p:cNvPr>
-          <p:cNvPicPr>
-            <a:picLocks noChangeAspect="1"/>
-          </p:cNvPicPr>
-          <p:nvPr/>
-        </p:nvPicPr>
-        <p:blipFill>
-          <a:blip r:embed="rId2">
-            <a:extLst>
-              <a:ext uri="{28A0092B-C50C-407E-A947-70E740481C1C}">
-                <a14:useLocalDpi xmlns:a14="http://schemas.microsoft.com/office/drawing/2010/main" val="0"/>
-              </a:ext>
-            </a:extLst>
-          </a:blip>
-          <a:stretch>
-            <a:fillRect/>
-          </a:stretch>
-        </p:blipFill>
-        <p:spPr>
-          <a:xfrm>
-            <a:off x="2253563" y="2901565"/>
-            <a:ext cx="7254239" cy="2176272"/>
-          </a:xfrm>
-          <a:prstGeom prst="rect">
-            <a:avLst/>
-          </a:prstGeom>
-        </p:spPr>
-      </p:pic>
-      <p:grpSp>
-        <p:nvGrpSpPr>
-          <p:cNvPr id="5" name="Group 4">
-            <a:extLst>
-              <a:ext uri="{FF2B5EF4-FFF2-40B4-BE49-F238E27FC236}">
-                <a16:creationId xmlns:a16="http://schemas.microsoft.com/office/drawing/2014/main" id="{5FB12978-6963-9B0E-A9CD-0FE3F614A3E8}"/>
-              </a:ext>
-            </a:extLst>
-          </p:cNvPr>
-          <p:cNvGrpSpPr/>
-          <p:nvPr/>
-        </p:nvGrpSpPr>
-        <p:grpSpPr>
-          <a:xfrm>
-            <a:off x="2655554" y="2162379"/>
-            <a:ext cx="5330855" cy="739186"/>
-            <a:chOff x="2655555" y="2162379"/>
-            <a:chExt cx="5180874" cy="738663"/>
-          </a:xfrm>
-        </p:grpSpPr>
-        <p:sp>
-          <p:nvSpPr>
-            <p:cNvPr id="9" name="TextBox 8">
-              <a:extLst>
-                <a:ext uri="{FF2B5EF4-FFF2-40B4-BE49-F238E27FC236}">
-                  <a16:creationId xmlns:a16="http://schemas.microsoft.com/office/drawing/2014/main" id="{CD2854BE-4858-239A-D110-275F14239262}"/>
-                </a:ext>
-              </a:extLst>
-            </p:cNvPr>
-            <p:cNvSpPr txBox="1"/>
-            <p:nvPr/>
-          </p:nvSpPr>
-          <p:spPr>
-            <a:xfrm>
-              <a:off x="2655555" y="2162379"/>
-              <a:ext cx="1286969" cy="738663"/>
-            </a:xfrm>
-            <a:prstGeom prst="rect">
-              <a:avLst/>
-            </a:prstGeom>
-            <a:solidFill>
-              <a:schemeClr val="accent1">
-                <a:lumMod val="40000"/>
-                <a:lumOff val="60000"/>
-              </a:schemeClr>
-            </a:solidFill>
-            <a:ln w="19050">
-              <a:solidFill>
-                <a:schemeClr val="accent1">
-                  <a:lumMod val="75000"/>
-                </a:schemeClr>
-              </a:solidFill>
-            </a:ln>
-          </p:spPr>
-          <p:txBody>
-            <a:bodyPr wrap="square" rtlCol="0">
-              <a:spAutoFit/>
-            </a:bodyPr>
-            <a:lstStyle/>
-            <a:p>
-              <a:pPr algn="ctr"/>
-              <a:r>
-                <a:rPr lang="en-US" sz="1400" dirty="0"/>
-                <a:t>Q1</a:t>
-              </a:r>
-            </a:p>
-            <a:p>
-              <a:pPr algn="ctr"/>
-              <a:r>
-                <a:rPr lang="en-US" sz="1400" dirty="0"/>
-                <a:t>NW n = 28</a:t>
-              </a:r>
-            </a:p>
-            <a:p>
-              <a:pPr algn="ctr"/>
-              <a:r>
-                <a:rPr lang="en-US" sz="1400" dirty="0"/>
-                <a:t>OB/OW n=16 </a:t>
-              </a:r>
-            </a:p>
-          </p:txBody>
-        </p:sp>
-        <p:sp>
-          <p:nvSpPr>
-            <p:cNvPr id="8" name="TextBox 7">
-              <a:extLst>
-                <a:ext uri="{FF2B5EF4-FFF2-40B4-BE49-F238E27FC236}">
-                  <a16:creationId xmlns:a16="http://schemas.microsoft.com/office/drawing/2014/main" id="{D6F3B412-A7EA-BEF5-24A6-E35BADD90C5B}"/>
-                </a:ext>
-              </a:extLst>
-            </p:cNvPr>
-            <p:cNvSpPr txBox="1"/>
-            <p:nvPr/>
-          </p:nvSpPr>
-          <p:spPr>
-            <a:xfrm>
-              <a:off x="3954392" y="2162379"/>
-              <a:ext cx="1286969" cy="738663"/>
-            </a:xfrm>
-            <a:prstGeom prst="rect">
-              <a:avLst/>
-            </a:prstGeom>
-            <a:solidFill>
-              <a:schemeClr val="accent1">
-                <a:lumMod val="40000"/>
-                <a:lumOff val="60000"/>
-              </a:schemeClr>
-            </a:solidFill>
-            <a:ln w="19050">
-              <a:solidFill>
-                <a:schemeClr val="accent1">
-                  <a:lumMod val="75000"/>
-                </a:schemeClr>
-              </a:solidFill>
-            </a:ln>
-          </p:spPr>
-          <p:txBody>
-            <a:bodyPr wrap="square" rtlCol="0">
-              <a:spAutoFit/>
-            </a:bodyPr>
-            <a:lstStyle/>
-            <a:p>
-              <a:pPr algn="ctr"/>
-              <a:r>
-                <a:rPr lang="en-US" sz="1400" dirty="0"/>
-                <a:t>Q2</a:t>
-              </a:r>
-            </a:p>
-            <a:p>
-              <a:pPr algn="ctr"/>
-              <a:r>
-                <a:rPr lang="en-US" sz="1400" dirty="0"/>
-                <a:t>NW n = 25</a:t>
-              </a:r>
-            </a:p>
-            <a:p>
-              <a:pPr algn="ctr"/>
-              <a:r>
-                <a:rPr lang="en-US" sz="1400" dirty="0"/>
-                <a:t>OB/OW n=35 </a:t>
-              </a:r>
-            </a:p>
-          </p:txBody>
-        </p:sp>
-        <p:sp>
-          <p:nvSpPr>
-            <p:cNvPr id="17" name="TextBox 16">
-              <a:extLst>
-                <a:ext uri="{FF2B5EF4-FFF2-40B4-BE49-F238E27FC236}">
-                  <a16:creationId xmlns:a16="http://schemas.microsoft.com/office/drawing/2014/main" id="{FA324568-338C-C99D-4805-60AF9BA25B92}"/>
-                </a:ext>
-              </a:extLst>
-            </p:cNvPr>
-            <p:cNvSpPr txBox="1"/>
-            <p:nvPr/>
-          </p:nvSpPr>
-          <p:spPr>
-            <a:xfrm>
-              <a:off x="5249591" y="2162379"/>
-              <a:ext cx="1289304" cy="738663"/>
-            </a:xfrm>
-            <a:prstGeom prst="rect">
-              <a:avLst/>
-            </a:prstGeom>
-            <a:solidFill>
-              <a:schemeClr val="accent1">
-                <a:lumMod val="40000"/>
-                <a:lumOff val="60000"/>
-              </a:schemeClr>
-            </a:solidFill>
-            <a:ln w="19050">
-              <a:solidFill>
-                <a:schemeClr val="accent1">
-                  <a:lumMod val="75000"/>
-                </a:schemeClr>
-              </a:solidFill>
-            </a:ln>
-          </p:spPr>
-          <p:txBody>
-            <a:bodyPr wrap="square" rtlCol="0">
-              <a:spAutoFit/>
-            </a:bodyPr>
-            <a:lstStyle/>
-            <a:p>
-              <a:pPr algn="ctr"/>
-              <a:r>
-                <a:rPr lang="en-US" sz="1400" dirty="0"/>
-                <a:t>Q3</a:t>
-              </a:r>
-            </a:p>
-            <a:p>
-              <a:pPr algn="ctr"/>
-              <a:r>
-                <a:rPr lang="en-US" sz="1400" dirty="0"/>
-                <a:t>NW n = 45</a:t>
-              </a:r>
-            </a:p>
-            <a:p>
-              <a:pPr algn="ctr"/>
-              <a:r>
-                <a:rPr lang="en-US" sz="1400" dirty="0"/>
-                <a:t>OB/OW n=33 </a:t>
-              </a:r>
-            </a:p>
-          </p:txBody>
-        </p:sp>
-        <p:sp>
-          <p:nvSpPr>
-            <p:cNvPr id="19" name="TextBox 18">
-              <a:extLst>
-                <a:ext uri="{FF2B5EF4-FFF2-40B4-BE49-F238E27FC236}">
-                  <a16:creationId xmlns:a16="http://schemas.microsoft.com/office/drawing/2014/main" id="{2AB2CBAF-9E32-9C3B-7838-655A36A75367}"/>
-                </a:ext>
-              </a:extLst>
-            </p:cNvPr>
-            <p:cNvSpPr txBox="1"/>
-            <p:nvPr/>
-          </p:nvSpPr>
-          <p:spPr>
-            <a:xfrm>
-              <a:off x="6547125" y="2162379"/>
-              <a:ext cx="1289304" cy="738663"/>
-            </a:xfrm>
-            <a:prstGeom prst="rect">
-              <a:avLst/>
-            </a:prstGeom>
-            <a:solidFill>
-              <a:schemeClr val="accent1">
-                <a:lumMod val="40000"/>
-                <a:lumOff val="60000"/>
-              </a:schemeClr>
-            </a:solidFill>
-            <a:ln w="19050">
-              <a:solidFill>
-                <a:schemeClr val="accent1">
-                  <a:lumMod val="75000"/>
-                </a:schemeClr>
-              </a:solidFill>
-            </a:ln>
-          </p:spPr>
-          <p:txBody>
-            <a:bodyPr wrap="square" rtlCol="0">
-              <a:spAutoFit/>
-            </a:bodyPr>
-            <a:lstStyle/>
-            <a:p>
-              <a:pPr algn="ctr"/>
-              <a:r>
-                <a:rPr lang="en-US" sz="1400" dirty="0"/>
-                <a:t>Q4</a:t>
-              </a:r>
-            </a:p>
-            <a:p>
-              <a:pPr algn="ctr"/>
-              <a:r>
-                <a:rPr lang="en-US" sz="1400" dirty="0"/>
-                <a:t>NW n = 18</a:t>
-              </a:r>
-            </a:p>
-            <a:p>
-              <a:pPr algn="ctr"/>
-              <a:r>
-                <a:rPr lang="en-US" sz="1400" dirty="0"/>
-                <a:t>OB/OW n=16 </a:t>
-              </a:r>
-            </a:p>
-          </p:txBody>
-        </p:sp>
-      </p:grpSp>
-    </p:spTree>
-    <p:extLst>
-      <p:ext uri="{BB962C8B-B14F-4D97-AF65-F5344CB8AC3E}">
-        <p14:creationId xmlns:p14="http://schemas.microsoft.com/office/powerpoint/2010/main" val="1218356846"/>
-      </p:ext>
-    </p:extLst>
-  </p:cSld>
-  <p:clrMapOvr>
-    <a:masterClrMapping/>
-  </p:clrMapOvr>
-</p:sld>
-</file>
-
 <file path=ppt/theme/theme1.xml><?xml version="1.0" encoding="utf-8"?>
 <a:theme xmlns:a="http://schemas.openxmlformats.org/drawingml/2006/main" name="Office Theme">
   <a:themeElements>

</xml_diff>